<commit_message>
Updating the internal presentation with the additional dashboard slides.
</commit_message>
<xml_diff>
--- a/Presentation and Tableu/Internal Predicting the NFL Game Winner Presentation.pptx
+++ b/Presentation and Tableu/Internal Predicting the NFL Game Winner Presentation.pptx
@@ -19,7 +19,9 @@
     <p:sldId id="266" r:id="rId13"/>
     <p:sldId id="264" r:id="rId14"/>
     <p:sldId id="271" r:id="rId15"/>
-    <p:sldId id="263" r:id="rId16"/>
+    <p:sldId id="272" r:id="rId16"/>
+    <p:sldId id="273" r:id="rId17"/>
+    <p:sldId id="263" r:id="rId18"/>
   </p:sldIdLst>
   <p:sldSz cx="12192000" cy="6858000"/>
   <p:notesSz cx="6858000" cy="9144000"/>
@@ -312,7 +314,7 @@
           <a:p>
             <a:fld id="{4AAD347D-5ACD-4C99-B74B-A9C85AD731AF}" type="datetimeFigureOut">
               <a:rPr lang="en-US" dirty="0"/>
-              <a:t>4/5/2023</a:t>
+              <a:t>4/6/2023</a:t>
             </a:fld>
             <a:endParaRPr lang="en-US" dirty="0"/>
           </a:p>
@@ -582,7 +584,7 @@
           <a:p>
             <a:fld id="{4509A250-FF31-4206-8172-F9D3106AACB1}" type="datetimeFigureOut">
               <a:rPr lang="en-US" dirty="0"/>
-              <a:t>4/5/2023</a:t>
+              <a:t>4/6/2023</a:t>
             </a:fld>
             <a:endParaRPr lang="en-US" dirty="0"/>
           </a:p>
@@ -771,7 +773,7 @@
           <a:p>
             <a:fld id="{4509A250-FF31-4206-8172-F9D3106AACB1}" type="datetimeFigureOut">
               <a:rPr lang="en-US" dirty="0"/>
-              <a:t>4/5/2023</a:t>
+              <a:t>4/6/2023</a:t>
             </a:fld>
             <a:endParaRPr lang="en-US" dirty="0"/>
           </a:p>
@@ -1039,7 +1041,7 @@
           <a:p>
             <a:fld id="{4509A250-FF31-4206-8172-F9D3106AACB1}" type="datetimeFigureOut">
               <a:rPr lang="en-US" dirty="0"/>
-              <a:t>4/5/2023</a:t>
+              <a:t>4/6/2023</a:t>
             </a:fld>
             <a:endParaRPr lang="en-US" dirty="0"/>
           </a:p>
@@ -1375,7 +1377,7 @@
           <a:p>
             <a:fld id="{4509A250-FF31-4206-8172-F9D3106AACB1}" type="datetimeFigureOut">
               <a:rPr lang="en-US" dirty="0"/>
-              <a:t>4/5/2023</a:t>
+              <a:t>4/6/2023</a:t>
             </a:fld>
             <a:endParaRPr lang="en-US" dirty="0"/>
           </a:p>
@@ -1993,7 +1995,7 @@
           <a:p>
             <a:fld id="{4509A250-FF31-4206-8172-F9D3106AACB1}" type="datetimeFigureOut">
               <a:rPr lang="en-US" dirty="0"/>
-              <a:t>4/5/2023</a:t>
+              <a:t>4/6/2023</a:t>
             </a:fld>
             <a:endParaRPr lang="en-US" dirty="0"/>
           </a:p>
@@ -2848,7 +2850,7 @@
           <a:p>
             <a:fld id="{4509A250-FF31-4206-8172-F9D3106AACB1}" type="datetimeFigureOut">
               <a:rPr lang="en-US" dirty="0"/>
-              <a:t>4/5/2023</a:t>
+              <a:t>4/6/2023</a:t>
             </a:fld>
             <a:endParaRPr lang="en-US" dirty="0"/>
           </a:p>
@@ -3013,7 +3015,7 @@
           <a:p>
             <a:fld id="{4509A250-FF31-4206-8172-F9D3106AACB1}" type="datetimeFigureOut">
               <a:rPr lang="en-US" dirty="0"/>
-              <a:t>4/5/2023</a:t>
+              <a:t>4/6/2023</a:t>
             </a:fld>
             <a:endParaRPr lang="en-US" dirty="0"/>
           </a:p>
@@ -3188,7 +3190,7 @@
           <a:p>
             <a:fld id="{4509A250-FF31-4206-8172-F9D3106AACB1}" type="datetimeFigureOut">
               <a:rPr lang="en-US" dirty="0"/>
-              <a:t>4/5/2023</a:t>
+              <a:t>4/6/2023</a:t>
             </a:fld>
             <a:endParaRPr lang="en-US" dirty="0"/>
           </a:p>
@@ -3353,7 +3355,7 @@
           <a:p>
             <a:fld id="{4509A250-FF31-4206-8172-F9D3106AACB1}" type="datetimeFigureOut">
               <a:rPr lang="en-US" dirty="0"/>
-              <a:t>4/5/2023</a:t>
+              <a:t>4/6/2023</a:t>
             </a:fld>
             <a:endParaRPr lang="en-US" dirty="0"/>
           </a:p>
@@ -3595,7 +3597,7 @@
           <a:p>
             <a:fld id="{9796027F-7875-4030-9381-8BD8C4F21935}" type="datetimeFigureOut">
               <a:rPr lang="en-US" dirty="0"/>
-              <a:t>4/5/2023</a:t>
+              <a:t>4/6/2023</a:t>
             </a:fld>
             <a:endParaRPr lang="en-US" dirty="0"/>
           </a:p>
@@ -3882,7 +3884,7 @@
           <a:p>
             <a:fld id="{9796027F-7875-4030-9381-8BD8C4F21935}" type="datetimeFigureOut">
               <a:rPr lang="en-US" dirty="0"/>
-              <a:t>4/5/2023</a:t>
+              <a:t>4/6/2023</a:t>
             </a:fld>
             <a:endParaRPr lang="en-US" dirty="0"/>
           </a:p>
@@ -4321,7 +4323,7 @@
           <a:p>
             <a:fld id="{9796027F-7875-4030-9381-8BD8C4F21935}" type="datetimeFigureOut">
               <a:rPr lang="en-US" dirty="0"/>
-              <a:t>4/5/2023</a:t>
+              <a:t>4/6/2023</a:t>
             </a:fld>
             <a:endParaRPr lang="en-US" dirty="0"/>
           </a:p>
@@ -4434,7 +4436,7 @@
           <a:p>
             <a:fld id="{4509A250-FF31-4206-8172-F9D3106AACB1}" type="datetimeFigureOut">
               <a:rPr lang="en-US" dirty="0"/>
-              <a:t>4/5/2023</a:t>
+              <a:t>4/6/2023</a:t>
             </a:fld>
             <a:endParaRPr lang="en-US" dirty="0"/>
           </a:p>
@@ -4524,7 +4526,7 @@
           <a:p>
             <a:fld id="{4509A250-FF31-4206-8172-F9D3106AACB1}" type="datetimeFigureOut">
               <a:rPr lang="en-US" dirty="0"/>
-              <a:t>4/5/2023</a:t>
+              <a:t>4/6/2023</a:t>
             </a:fld>
             <a:endParaRPr lang="en-US" dirty="0"/>
           </a:p>
@@ -4798,7 +4800,7 @@
           <a:p>
             <a:fld id="{4509A250-FF31-4206-8172-F9D3106AACB1}" type="datetimeFigureOut">
               <a:rPr lang="en-US" dirty="0"/>
-              <a:t>4/5/2023</a:t>
+              <a:t>4/6/2023</a:t>
             </a:fld>
             <a:endParaRPr lang="en-US" dirty="0"/>
           </a:p>
@@ -5068,7 +5070,7 @@
           <a:p>
             <a:fld id="{4509A250-FF31-4206-8172-F9D3106AACB1}" type="datetimeFigureOut">
               <a:rPr lang="en-US" dirty="0"/>
-              <a:t>4/5/2023</a:t>
+              <a:t>4/6/2023</a:t>
             </a:fld>
             <a:endParaRPr lang="en-US" dirty="0"/>
           </a:p>
@@ -5492,7 +5494,7 @@
           <a:p>
             <a:fld id="{4AAD347D-5ACD-4C99-B74B-A9C85AD731AF}" type="datetimeFigureOut">
               <a:rPr lang="en-US" dirty="0"/>
-              <a:t>4/5/2023</a:t>
+              <a:t>4/6/2023</a:t>
             </a:fld>
             <a:endParaRPr lang="en-US" dirty="0"/>
           </a:p>
@@ -7005,6 +7007,275 @@
           <a:p>
             <a:r>
               <a:rPr lang="en-US" dirty="0"/>
+              <a:t>Data Visualizations Used</a:t>
+            </a:r>
+          </a:p>
+        </p:txBody>
+      </p:sp>
+      <p:sp>
+        <p:nvSpPr>
+          <p:cNvPr id="4" name="TextBox 3">
+            <a:extLst>
+              <a:ext uri="{FF2B5EF4-FFF2-40B4-BE49-F238E27FC236}">
+                <a16:creationId xmlns:a16="http://schemas.microsoft.com/office/drawing/2014/main" id="{A89D8DF3-ED52-214A-C8D7-6F4D07A922D2}"/>
+              </a:ext>
+            </a:extLst>
+          </p:cNvPr>
+          <p:cNvSpPr txBox="1"/>
+          <p:nvPr/>
+        </p:nvSpPr>
+        <p:spPr>
+          <a:xfrm>
+            <a:off x="810883" y="6066728"/>
+            <a:ext cx="11260731" cy="338554"/>
+          </a:xfrm>
+          <a:prstGeom prst="rect">
+            <a:avLst/>
+          </a:prstGeom>
+          <a:noFill/>
+        </p:spPr>
+        <p:txBody>
+          <a:bodyPr wrap="square">
+            <a:spAutoFit/>
+          </a:bodyPr>
+          <a:lstStyle/>
+          <a:p>
+            <a:r>
+              <a:rPr lang="en-US" sz="1600" dirty="0"/>
+              <a:t>https://public.tableau.com/app/profile/samuel.kuczynski/viz/Final_Project_16807594084690/Dashboard1</a:t>
+            </a:r>
+          </a:p>
+        </p:txBody>
+      </p:sp>
+      <p:pic>
+        <p:nvPicPr>
+          <p:cNvPr id="6" name="Picture 5">
+            <a:extLst>
+              <a:ext uri="{FF2B5EF4-FFF2-40B4-BE49-F238E27FC236}">
+                <a16:creationId xmlns:a16="http://schemas.microsoft.com/office/drawing/2014/main" id="{7C6A6A3B-322B-90A6-D85E-DCCB04F889FD}"/>
+              </a:ext>
+            </a:extLst>
+          </p:cNvPr>
+          <p:cNvPicPr>
+            <a:picLocks noChangeAspect="1"/>
+          </p:cNvPicPr>
+          <p:nvPr/>
+        </p:nvPicPr>
+        <p:blipFill>
+          <a:blip r:embed="rId2"/>
+          <a:stretch>
+            <a:fillRect/>
+          </a:stretch>
+        </p:blipFill>
+        <p:spPr>
+          <a:xfrm>
+            <a:off x="1134373" y="1561774"/>
+            <a:ext cx="9923253" cy="4277720"/>
+          </a:xfrm>
+          <a:prstGeom prst="rect">
+            <a:avLst/>
+          </a:prstGeom>
+        </p:spPr>
+      </p:pic>
+    </p:spTree>
+    <p:extLst>
+      <p:ext uri="{BB962C8B-B14F-4D97-AF65-F5344CB8AC3E}">
+        <p14:creationId xmlns:p14="http://schemas.microsoft.com/office/powerpoint/2010/main" val="189418872"/>
+      </p:ext>
+    </p:extLst>
+  </p:cSld>
+  <p:clrMapOvr>
+    <a:masterClrMapping/>
+  </p:clrMapOvr>
+  <mc:AlternateContent xmlns:mc="http://schemas.openxmlformats.org/markup-compatibility/2006">
+    <mc:Choice xmlns:p15="http://schemas.microsoft.com/office/powerpoint/2012/main" Requires="p15">
+      <p:transition xmlns:p14="http://schemas.microsoft.com/office/powerpoint/2010/main" spd="slow" p14:dur="1250">
+        <p15:prstTrans prst="pageCurlDouble"/>
+      </p:transition>
+    </mc:Choice>
+    <mc:Fallback>
+      <p:transition spd="slow">
+        <p:fade/>
+      </p:transition>
+    </mc:Fallback>
+  </mc:AlternateContent>
+</p:sld>
+</file>
+
+<file path=ppt/slides/slide16.xml><?xml version="1.0" encoding="utf-8"?>
+<p:sld xmlns:a="http://schemas.openxmlformats.org/drawingml/2006/main" xmlns:r="http://schemas.openxmlformats.org/officeDocument/2006/relationships" xmlns:p="http://schemas.openxmlformats.org/presentationml/2006/main">
+  <p:cSld>
+    <p:spTree>
+      <p:nvGrpSpPr>
+        <p:cNvPr id="1" name=""/>
+        <p:cNvGrpSpPr/>
+        <p:nvPr/>
+      </p:nvGrpSpPr>
+      <p:grpSpPr>
+        <a:xfrm>
+          <a:off x="0" y="0"/>
+          <a:ext cx="0" cy="0"/>
+          <a:chOff x="0" y="0"/>
+          <a:chExt cx="0" cy="0"/>
+        </a:xfrm>
+      </p:grpSpPr>
+      <p:sp>
+        <p:nvSpPr>
+          <p:cNvPr id="2" name="Title 1">
+            <a:extLst>
+              <a:ext uri="{FF2B5EF4-FFF2-40B4-BE49-F238E27FC236}">
+                <a16:creationId xmlns:a16="http://schemas.microsoft.com/office/drawing/2014/main" id="{58C23109-145E-711C-EE73-C0C5A2EBE81E}"/>
+              </a:ext>
+            </a:extLst>
+          </p:cNvPr>
+          <p:cNvSpPr>
+            <a:spLocks noGrp="1"/>
+          </p:cNvSpPr>
+          <p:nvPr>
+            <p:ph type="title"/>
+          </p:nvPr>
+        </p:nvSpPr>
+        <p:spPr/>
+        <p:txBody>
+          <a:bodyPr/>
+          <a:lstStyle/>
+          <a:p>
+            <a:r>
+              <a:rPr lang="en-US" dirty="0"/>
+              <a:t>Interactive Dashboard</a:t>
+            </a:r>
+          </a:p>
+        </p:txBody>
+      </p:sp>
+      <p:sp>
+        <p:nvSpPr>
+          <p:cNvPr id="4" name="TextBox 3">
+            <a:extLst>
+              <a:ext uri="{FF2B5EF4-FFF2-40B4-BE49-F238E27FC236}">
+                <a16:creationId xmlns:a16="http://schemas.microsoft.com/office/drawing/2014/main" id="{A89D8DF3-ED52-214A-C8D7-6F4D07A922D2}"/>
+              </a:ext>
+            </a:extLst>
+          </p:cNvPr>
+          <p:cNvSpPr txBox="1"/>
+          <p:nvPr/>
+        </p:nvSpPr>
+        <p:spPr>
+          <a:xfrm>
+            <a:off x="129397" y="6066728"/>
+            <a:ext cx="11942218" cy="307777"/>
+          </a:xfrm>
+          <a:prstGeom prst="rect">
+            <a:avLst/>
+          </a:prstGeom>
+          <a:noFill/>
+        </p:spPr>
+        <p:txBody>
+          <a:bodyPr wrap="square">
+            <a:spAutoFit/>
+          </a:bodyPr>
+          <a:lstStyle/>
+          <a:p>
+            <a:r>
+              <a:rPr lang="en-US" sz="1400" dirty="0"/>
+              <a:t>https://public.tableau.com/app/profile/samuel.kuczynski/viz/Final_Project_Interactive_Dashboard/Interactive_Dashboard_Final</a:t>
+            </a:r>
+          </a:p>
+        </p:txBody>
+      </p:sp>
+      <p:pic>
+        <p:nvPicPr>
+          <p:cNvPr id="6" name="Picture 5">
+            <a:extLst>
+              <a:ext uri="{FF2B5EF4-FFF2-40B4-BE49-F238E27FC236}">
+                <a16:creationId xmlns:a16="http://schemas.microsoft.com/office/drawing/2014/main" id="{7C6A6A3B-322B-90A6-D85E-DCCB04F889FD}"/>
+              </a:ext>
+            </a:extLst>
+          </p:cNvPr>
+          <p:cNvPicPr>
+            <a:picLocks noChangeAspect="1"/>
+          </p:cNvPicPr>
+          <p:nvPr/>
+        </p:nvPicPr>
+        <p:blipFill>
+          <a:blip r:embed="rId2"/>
+          <a:srcRect/>
+          <a:stretch/>
+        </p:blipFill>
+        <p:spPr>
+          <a:xfrm>
+            <a:off x="1036718" y="1561774"/>
+            <a:ext cx="9326082" cy="4277720"/>
+          </a:xfrm>
+          <a:prstGeom prst="rect">
+            <a:avLst/>
+          </a:prstGeom>
+        </p:spPr>
+      </p:pic>
+    </p:spTree>
+    <p:extLst>
+      <p:ext uri="{BB962C8B-B14F-4D97-AF65-F5344CB8AC3E}">
+        <p14:creationId xmlns:p14="http://schemas.microsoft.com/office/powerpoint/2010/main" val="2437936306"/>
+      </p:ext>
+    </p:extLst>
+  </p:cSld>
+  <p:clrMapOvr>
+    <a:masterClrMapping/>
+  </p:clrMapOvr>
+  <mc:AlternateContent xmlns:mc="http://schemas.openxmlformats.org/markup-compatibility/2006">
+    <mc:Choice xmlns:p15="http://schemas.microsoft.com/office/powerpoint/2012/main" Requires="p15">
+      <p:transition xmlns:p14="http://schemas.microsoft.com/office/powerpoint/2010/main" spd="slow" p14:dur="1250">
+        <p15:prstTrans prst="pageCurlDouble"/>
+      </p:transition>
+    </mc:Choice>
+    <mc:Fallback>
+      <p:transition spd="slow">
+        <p:fade/>
+      </p:transition>
+    </mc:Fallback>
+  </mc:AlternateContent>
+</p:sld>
+</file>
+
+<file path=ppt/slides/slide17.xml><?xml version="1.0" encoding="utf-8"?>
+<p:sld xmlns:a="http://schemas.openxmlformats.org/drawingml/2006/main" xmlns:r="http://schemas.openxmlformats.org/officeDocument/2006/relationships" xmlns:p="http://schemas.openxmlformats.org/presentationml/2006/main">
+  <p:cSld>
+    <p:spTree>
+      <p:nvGrpSpPr>
+        <p:cNvPr id="1" name=""/>
+        <p:cNvGrpSpPr/>
+        <p:nvPr/>
+      </p:nvGrpSpPr>
+      <p:grpSpPr>
+        <a:xfrm>
+          <a:off x="0" y="0"/>
+          <a:ext cx="0" cy="0"/>
+          <a:chOff x="0" y="0"/>
+          <a:chExt cx="0" cy="0"/>
+        </a:xfrm>
+      </p:grpSpPr>
+      <p:sp>
+        <p:nvSpPr>
+          <p:cNvPr id="2" name="Title 1">
+            <a:extLst>
+              <a:ext uri="{FF2B5EF4-FFF2-40B4-BE49-F238E27FC236}">
+                <a16:creationId xmlns:a16="http://schemas.microsoft.com/office/drawing/2014/main" id="{58C23109-145E-711C-EE73-C0C5A2EBE81E}"/>
+              </a:ext>
+            </a:extLst>
+          </p:cNvPr>
+          <p:cNvSpPr>
+            <a:spLocks noGrp="1"/>
+          </p:cNvSpPr>
+          <p:nvPr>
+            <p:ph type="title"/>
+          </p:nvPr>
+        </p:nvSpPr>
+        <p:spPr/>
+        <p:txBody>
+          <a:bodyPr/>
+          <a:lstStyle/>
+          <a:p>
+            <a:r>
+              <a:rPr lang="en-US" dirty="0"/>
               <a:t>Questions</a:t>
             </a:r>
           </a:p>

</xml_diff>